<commit_message>
larger changes to ifraem displau
</commit_message>
<xml_diff>
--- a/files/Josephs.pptx
+++ b/files/Josephs.pptx
@@ -6,6 +6,10 @@
   </p:sldMasterIdLst>
   <p:sldIdLst>
     <p:sldId id="256" r:id="rId2"/>
+    <p:sldId id="257" r:id="rId3"/>
+    <p:sldId id="258" r:id="rId4"/>
+    <p:sldId id="259" r:id="rId5"/>
+    <p:sldId id="260" r:id="rId6"/>
   </p:sldIdLst>
   <p:sldSz cx="12192000" cy="6858000"/>
   <p:notesSz cx="6858000" cy="9144000"/>
@@ -104,6 +108,11 @@
       </a:defRPr>
     </a:lvl9pPr>
   </p:defaultTextStyle>
+  <p:extLst>
+    <p:ext uri="{EFAFB233-063F-42B5-8137-9DF3F51BA10A}">
+      <p15:sldGuideLst xmlns:p15="http://schemas.microsoft.com/office/powerpoint/2012/main"/>
+    </p:ext>
+  </p:extLst>
 </p:presentation>
 </file>
 
@@ -3378,6 +3387,575 @@
     <p:extLst>
       <p:ext uri="{BB962C8B-B14F-4D97-AF65-F5344CB8AC3E}">
         <p14:creationId xmlns:p14="http://schemas.microsoft.com/office/powerpoint/2010/main" val="651706447"/>
+      </p:ext>
+    </p:extLst>
+  </p:cSld>
+  <p:clrMapOvr>
+    <a:masterClrMapping/>
+  </p:clrMapOvr>
+</p:sld>
+</file>
+
+<file path=ppt/slides/slide2.xml><?xml version="1.0" encoding="utf-8"?>
+<p:sld xmlns:a="http://schemas.openxmlformats.org/drawingml/2006/main" xmlns:r="http://schemas.openxmlformats.org/officeDocument/2006/relationships" xmlns:p="http://schemas.openxmlformats.org/presentationml/2006/main">
+  <p:cSld>
+    <p:spTree>
+      <p:nvGrpSpPr>
+        <p:cNvPr id="1" name=""/>
+        <p:cNvGrpSpPr/>
+        <p:nvPr/>
+      </p:nvGrpSpPr>
+      <p:grpSpPr>
+        <a:xfrm>
+          <a:off x="0" y="0"/>
+          <a:ext cx="0" cy="0"/>
+          <a:chOff x="0" y="0"/>
+          <a:chExt cx="0" cy="0"/>
+        </a:xfrm>
+      </p:grpSpPr>
+      <p:sp>
+        <p:nvSpPr>
+          <p:cNvPr id="2" name="Title 1">
+            <a:extLst>
+              <a:ext uri="{FF2B5EF4-FFF2-40B4-BE49-F238E27FC236}">
+                <a16:creationId xmlns:a16="http://schemas.microsoft.com/office/drawing/2014/main" id="{803AA371-149A-13F9-C867-823656F0EFE1}"/>
+              </a:ext>
+            </a:extLst>
+          </p:cNvPr>
+          <p:cNvSpPr>
+            <a:spLocks noGrp="1"/>
+          </p:cNvSpPr>
+          <p:nvPr>
+            <p:ph type="title"/>
+          </p:nvPr>
+        </p:nvSpPr>
+        <p:spPr/>
+        <p:txBody>
+          <a:bodyPr/>
+          <a:lstStyle/>
+          <a:p>
+            <a:endParaRPr lang="en-GB"/>
+          </a:p>
+        </p:txBody>
+      </p:sp>
+      <p:sp>
+        <p:nvSpPr>
+          <p:cNvPr id="3" name="Content Placeholder 2">
+            <a:extLst>
+              <a:ext uri="{FF2B5EF4-FFF2-40B4-BE49-F238E27FC236}">
+                <a16:creationId xmlns:a16="http://schemas.microsoft.com/office/drawing/2014/main" id="{E33C8CCE-9E3F-1344-E044-3D8AAB8117F8}"/>
+              </a:ext>
+            </a:extLst>
+          </p:cNvPr>
+          <p:cNvSpPr>
+            <a:spLocks noGrp="1"/>
+          </p:cNvSpPr>
+          <p:nvPr>
+            <p:ph idx="1"/>
+          </p:nvPr>
+        </p:nvSpPr>
+        <p:spPr/>
+        <p:txBody>
+          <a:bodyPr/>
+          <a:lstStyle/>
+          <a:p>
+            <a:endParaRPr lang="en-GB"/>
+          </a:p>
+        </p:txBody>
+      </p:sp>
+    </p:spTree>
+    <p:extLst>
+      <p:ext uri="{BB962C8B-B14F-4D97-AF65-F5344CB8AC3E}">
+        <p14:creationId xmlns:p14="http://schemas.microsoft.com/office/powerpoint/2010/main" val="2764796307"/>
+      </p:ext>
+    </p:extLst>
+  </p:cSld>
+  <p:clrMapOvr>
+    <a:masterClrMapping/>
+  </p:clrMapOvr>
+</p:sld>
+</file>
+
+<file path=ppt/slides/slide3.xml><?xml version="1.0" encoding="utf-8"?>
+<p:sld xmlns:a="http://schemas.openxmlformats.org/drawingml/2006/main" xmlns:r="http://schemas.openxmlformats.org/officeDocument/2006/relationships" xmlns:p="http://schemas.openxmlformats.org/presentationml/2006/main">
+  <p:cSld>
+    <p:spTree>
+      <p:nvGrpSpPr>
+        <p:cNvPr id="1" name=""/>
+        <p:cNvGrpSpPr/>
+        <p:nvPr/>
+      </p:nvGrpSpPr>
+      <p:grpSpPr>
+        <a:xfrm>
+          <a:off x="0" y="0"/>
+          <a:ext cx="0" cy="0"/>
+          <a:chOff x="0" y="0"/>
+          <a:chExt cx="0" cy="0"/>
+        </a:xfrm>
+      </p:grpSpPr>
+      <p:sp>
+        <p:nvSpPr>
+          <p:cNvPr id="2" name="Title 1">
+            <a:extLst>
+              <a:ext uri="{FF2B5EF4-FFF2-40B4-BE49-F238E27FC236}">
+                <a16:creationId xmlns:a16="http://schemas.microsoft.com/office/drawing/2014/main" id="{AA256628-2D67-627E-0A7F-5691CDACDA76}"/>
+              </a:ext>
+            </a:extLst>
+          </p:cNvPr>
+          <p:cNvSpPr>
+            <a:spLocks noGrp="1"/>
+          </p:cNvSpPr>
+          <p:nvPr>
+            <p:ph type="title"/>
+          </p:nvPr>
+        </p:nvSpPr>
+        <p:spPr/>
+        <p:txBody>
+          <a:bodyPr/>
+          <a:lstStyle/>
+          <a:p>
+            <a:endParaRPr lang="en-GB"/>
+          </a:p>
+        </p:txBody>
+      </p:sp>
+      <p:sp>
+        <p:nvSpPr>
+          <p:cNvPr id="3" name="Content Placeholder 2">
+            <a:extLst>
+              <a:ext uri="{FF2B5EF4-FFF2-40B4-BE49-F238E27FC236}">
+                <a16:creationId xmlns:a16="http://schemas.microsoft.com/office/drawing/2014/main" id="{5DD95BDA-83B5-F48B-5364-9AEFAA8E6691}"/>
+              </a:ext>
+            </a:extLst>
+          </p:cNvPr>
+          <p:cNvSpPr>
+            <a:spLocks noGrp="1"/>
+          </p:cNvSpPr>
+          <p:nvPr>
+            <p:ph idx="1"/>
+          </p:nvPr>
+        </p:nvSpPr>
+        <p:spPr/>
+        <p:txBody>
+          <a:bodyPr/>
+          <a:lstStyle/>
+          <a:p>
+            <a:endParaRPr lang="en-GB"/>
+          </a:p>
+        </p:txBody>
+      </p:sp>
+      <p:sp>
+        <p:nvSpPr>
+          <p:cNvPr id="4" name="Free-form: Shape 3">
+            <a:extLst>
+              <a:ext uri="{FF2B5EF4-FFF2-40B4-BE49-F238E27FC236}">
+                <a16:creationId xmlns:a16="http://schemas.microsoft.com/office/drawing/2014/main" id="{E3725415-9A69-27E6-F6D1-4824971BA30E}"/>
+              </a:ext>
+            </a:extLst>
+          </p:cNvPr>
+          <p:cNvSpPr/>
+          <p:nvPr/>
+        </p:nvSpPr>
+        <p:spPr>
+          <a:xfrm>
+            <a:off x="4840510" y="262822"/>
+            <a:ext cx="3124821" cy="3102499"/>
+          </a:xfrm>
+          <a:custGeom>
+            <a:avLst/>
+            <a:gdLst>
+              <a:gd name="connsiteX0" fmla="*/ 152114 w 3124821"/>
+              <a:gd name="connsiteY0" fmla="*/ 532706 h 3102499"/>
+              <a:gd name="connsiteX1" fmla="*/ 152114 w 3124821"/>
+              <a:gd name="connsiteY1" fmla="*/ 532706 h 3102499"/>
+              <a:gd name="connsiteX2" fmla="*/ 133826 w 3124821"/>
+              <a:gd name="connsiteY2" fmla="*/ 2791274 h 3102499"/>
+              <a:gd name="connsiteX3" fmla="*/ 334994 w 3124821"/>
+              <a:gd name="connsiteY3" fmla="*/ 3019874 h 3102499"/>
+              <a:gd name="connsiteX4" fmla="*/ 1039082 w 3124821"/>
+              <a:gd name="connsiteY4" fmla="*/ 3102170 h 3102499"/>
+              <a:gd name="connsiteX5" fmla="*/ 2575274 w 3124821"/>
+              <a:gd name="connsiteY5" fmla="*/ 3074738 h 3102499"/>
+              <a:gd name="connsiteX6" fmla="*/ 3105626 w 3124821"/>
+              <a:gd name="connsiteY6" fmla="*/ 2946722 h 3102499"/>
+              <a:gd name="connsiteX7" fmla="*/ 1642586 w 3124821"/>
+              <a:gd name="connsiteY7" fmla="*/ 807026 h 3102499"/>
+              <a:gd name="connsiteX8" fmla="*/ 417290 w 3124821"/>
+              <a:gd name="connsiteY8" fmla="*/ 2354 h 3102499"/>
+              <a:gd name="connsiteX9" fmla="*/ 270986 w 3124821"/>
+              <a:gd name="connsiteY9" fmla="*/ 75506 h 3102499"/>
+              <a:gd name="connsiteX10" fmla="*/ 152114 w 3124821"/>
+              <a:gd name="connsiteY10" fmla="*/ 532706 h 3102499"/>
+            </a:gdLst>
+            <a:ahLst/>
+            <a:cxnLst>
+              <a:cxn ang="0">
+                <a:pos x="connsiteX0" y="connsiteY0"/>
+              </a:cxn>
+              <a:cxn ang="0">
+                <a:pos x="connsiteX1" y="connsiteY1"/>
+              </a:cxn>
+              <a:cxn ang="0">
+                <a:pos x="connsiteX2" y="connsiteY2"/>
+              </a:cxn>
+              <a:cxn ang="0">
+                <a:pos x="connsiteX3" y="connsiteY3"/>
+              </a:cxn>
+              <a:cxn ang="0">
+                <a:pos x="connsiteX4" y="connsiteY4"/>
+              </a:cxn>
+              <a:cxn ang="0">
+                <a:pos x="connsiteX5" y="connsiteY5"/>
+              </a:cxn>
+              <a:cxn ang="0">
+                <a:pos x="connsiteX6" y="connsiteY6"/>
+              </a:cxn>
+              <a:cxn ang="0">
+                <a:pos x="connsiteX7" y="connsiteY7"/>
+              </a:cxn>
+              <a:cxn ang="0">
+                <a:pos x="connsiteX8" y="connsiteY8"/>
+              </a:cxn>
+              <a:cxn ang="0">
+                <a:pos x="connsiteX9" y="connsiteY9"/>
+              </a:cxn>
+              <a:cxn ang="0">
+                <a:pos x="connsiteX10" y="connsiteY10"/>
+              </a:cxn>
+            </a:cxnLst>
+            <a:rect l="l" t="t" r="r" b="b"/>
+            <a:pathLst>
+              <a:path w="3124821" h="3102499">
+                <a:moveTo>
+                  <a:pt x="152114" y="532706"/>
+                </a:moveTo>
+                <a:lnTo>
+                  <a:pt x="152114" y="532706"/>
+                </a:lnTo>
+                <a:cubicBezTo>
+                  <a:pt x="-14511" y="1494004"/>
+                  <a:pt x="-76587" y="1535172"/>
+                  <a:pt x="133826" y="2791274"/>
+                </a:cubicBezTo>
+                <a:cubicBezTo>
+                  <a:pt x="150595" y="2891383"/>
+                  <a:pt x="241946" y="2979315"/>
+                  <a:pt x="334994" y="3019874"/>
+                </a:cubicBezTo>
+                <a:cubicBezTo>
+                  <a:pt x="547091" y="3112327"/>
+                  <a:pt x="808641" y="3102170"/>
+                  <a:pt x="1039082" y="3102170"/>
+                </a:cubicBezTo>
+                <a:lnTo>
+                  <a:pt x="2575274" y="3074738"/>
+                </a:lnTo>
+                <a:cubicBezTo>
+                  <a:pt x="2752058" y="3032066"/>
+                  <a:pt x="3062248" y="3123334"/>
+                  <a:pt x="3105626" y="2946722"/>
+                </a:cubicBezTo>
+                <a:cubicBezTo>
+                  <a:pt x="3303217" y="2142246"/>
+                  <a:pt x="1916591" y="1089462"/>
+                  <a:pt x="1642586" y="807026"/>
+                </a:cubicBezTo>
+                <a:lnTo>
+                  <a:pt x="417290" y="2354"/>
+                </a:lnTo>
+                <a:cubicBezTo>
+                  <a:pt x="249692" y="12829"/>
+                  <a:pt x="270986" y="-37365"/>
+                  <a:pt x="270986" y="75506"/>
+                </a:cubicBezTo>
+                <a:lnTo>
+                  <a:pt x="152114" y="532706"/>
+                </a:lnTo>
+                <a:close/>
+              </a:path>
+            </a:pathLst>
+          </a:custGeom>
+        </p:spPr>
+        <p:style>
+          <a:lnRef idx="2">
+            <a:schemeClr val="accent1">
+              <a:shade val="15000"/>
+            </a:schemeClr>
+          </a:lnRef>
+          <a:fillRef idx="1">
+            <a:schemeClr val="accent1"/>
+          </a:fillRef>
+          <a:effectRef idx="0">
+            <a:schemeClr val="accent1"/>
+          </a:effectRef>
+          <a:fontRef idx="minor">
+            <a:schemeClr val="lt1"/>
+          </a:fontRef>
+        </p:style>
+        <p:txBody>
+          <a:bodyPr rtlCol="0" anchor="ctr"/>
+          <a:lstStyle/>
+          <a:p>
+            <a:pPr algn="ctr"/>
+            <a:endParaRPr lang="en-GB"/>
+          </a:p>
+        </p:txBody>
+      </p:sp>
+    </p:spTree>
+    <p:extLst>
+      <p:ext uri="{BB962C8B-B14F-4D97-AF65-F5344CB8AC3E}">
+        <p14:creationId xmlns:p14="http://schemas.microsoft.com/office/powerpoint/2010/main" val="2703878566"/>
+      </p:ext>
+    </p:extLst>
+  </p:cSld>
+  <p:clrMapOvr>
+    <a:masterClrMapping/>
+  </p:clrMapOvr>
+</p:sld>
+</file>
+
+<file path=ppt/slides/slide4.xml><?xml version="1.0" encoding="utf-8"?>
+<p:sld xmlns:a="http://schemas.openxmlformats.org/drawingml/2006/main" xmlns:r="http://schemas.openxmlformats.org/officeDocument/2006/relationships" xmlns:p="http://schemas.openxmlformats.org/presentationml/2006/main">
+  <p:cSld>
+    <p:spTree>
+      <p:nvGrpSpPr>
+        <p:cNvPr id="1" name=""/>
+        <p:cNvGrpSpPr/>
+        <p:nvPr/>
+      </p:nvGrpSpPr>
+      <p:grpSpPr>
+        <a:xfrm>
+          <a:off x="0" y="0"/>
+          <a:ext cx="0" cy="0"/>
+          <a:chOff x="0" y="0"/>
+          <a:chExt cx="0" cy="0"/>
+        </a:xfrm>
+      </p:grpSpPr>
+      <p:sp>
+        <p:nvSpPr>
+          <p:cNvPr id="2" name="Title 1">
+            <a:extLst>
+              <a:ext uri="{FF2B5EF4-FFF2-40B4-BE49-F238E27FC236}">
+                <a16:creationId xmlns:a16="http://schemas.microsoft.com/office/drawing/2014/main" id="{62638AAD-F02F-F020-F6D1-F5DA978E2DD5}"/>
+              </a:ext>
+            </a:extLst>
+          </p:cNvPr>
+          <p:cNvSpPr>
+            <a:spLocks noGrp="1"/>
+          </p:cNvSpPr>
+          <p:nvPr>
+            <p:ph type="title"/>
+          </p:nvPr>
+        </p:nvSpPr>
+        <p:spPr/>
+        <p:txBody>
+          <a:bodyPr/>
+          <a:lstStyle/>
+          <a:p>
+            <a:endParaRPr lang="en-GB"/>
+          </a:p>
+        </p:txBody>
+      </p:sp>
+      <p:sp>
+        <p:nvSpPr>
+          <p:cNvPr id="3" name="Content Placeholder 2">
+            <a:extLst>
+              <a:ext uri="{FF2B5EF4-FFF2-40B4-BE49-F238E27FC236}">
+                <a16:creationId xmlns:a16="http://schemas.microsoft.com/office/drawing/2014/main" id="{9C27D634-36FA-92FE-8163-D3D87E361E54}"/>
+              </a:ext>
+            </a:extLst>
+          </p:cNvPr>
+          <p:cNvSpPr>
+            <a:spLocks noGrp="1"/>
+          </p:cNvSpPr>
+          <p:nvPr>
+            <p:ph idx="1"/>
+          </p:nvPr>
+        </p:nvSpPr>
+        <p:spPr/>
+        <p:txBody>
+          <a:bodyPr/>
+          <a:lstStyle/>
+          <a:p>
+            <a:endParaRPr lang="en-GB"/>
+          </a:p>
+        </p:txBody>
+      </p:sp>
+      <p:sp>
+        <p:nvSpPr>
+          <p:cNvPr id="4" name="Arrow: Down 3">
+            <a:extLst>
+              <a:ext uri="{FF2B5EF4-FFF2-40B4-BE49-F238E27FC236}">
+                <a16:creationId xmlns:a16="http://schemas.microsoft.com/office/drawing/2014/main" id="{56D5002C-7D5D-BDE0-A72E-A6EDE77EFBAA}"/>
+              </a:ext>
+            </a:extLst>
+          </p:cNvPr>
+          <p:cNvSpPr/>
+          <p:nvPr/>
+        </p:nvSpPr>
+        <p:spPr>
+          <a:xfrm>
+            <a:off x="3877056" y="2962656"/>
+            <a:ext cx="2971800" cy="292608"/>
+          </a:xfrm>
+          <a:prstGeom prst="downArrow">
+            <a:avLst/>
+          </a:prstGeom>
+        </p:spPr>
+        <p:style>
+          <a:lnRef idx="2">
+            <a:schemeClr val="accent1">
+              <a:shade val="15000"/>
+            </a:schemeClr>
+          </a:lnRef>
+          <a:fillRef idx="1">
+            <a:schemeClr val="accent1"/>
+          </a:fillRef>
+          <a:effectRef idx="0">
+            <a:schemeClr val="accent1"/>
+          </a:effectRef>
+          <a:fontRef idx="minor">
+            <a:schemeClr val="lt1"/>
+          </a:fontRef>
+        </p:style>
+        <p:txBody>
+          <a:bodyPr rtlCol="0" anchor="ctr"/>
+          <a:lstStyle/>
+          <a:p>
+            <a:pPr algn="ctr"/>
+            <a:endParaRPr lang="en-GB"/>
+          </a:p>
+        </p:txBody>
+      </p:sp>
+    </p:spTree>
+    <p:extLst>
+      <p:ext uri="{BB962C8B-B14F-4D97-AF65-F5344CB8AC3E}">
+        <p14:creationId xmlns:p14="http://schemas.microsoft.com/office/powerpoint/2010/main" val="3502695528"/>
+      </p:ext>
+    </p:extLst>
+  </p:cSld>
+  <p:clrMapOvr>
+    <a:masterClrMapping/>
+  </p:clrMapOvr>
+</p:sld>
+</file>
+
+<file path=ppt/slides/slide5.xml><?xml version="1.0" encoding="utf-8"?>
+<p:sld xmlns:a="http://schemas.openxmlformats.org/drawingml/2006/main" xmlns:r="http://schemas.openxmlformats.org/officeDocument/2006/relationships" xmlns:p="http://schemas.openxmlformats.org/presentationml/2006/main">
+  <p:cSld>
+    <p:spTree>
+      <p:nvGrpSpPr>
+        <p:cNvPr id="1" name=""/>
+        <p:cNvGrpSpPr/>
+        <p:nvPr/>
+      </p:nvGrpSpPr>
+      <p:grpSpPr>
+        <a:xfrm>
+          <a:off x="0" y="0"/>
+          <a:ext cx="0" cy="0"/>
+          <a:chOff x="0" y="0"/>
+          <a:chExt cx="0" cy="0"/>
+        </a:xfrm>
+      </p:grpSpPr>
+      <p:sp>
+        <p:nvSpPr>
+          <p:cNvPr id="2" name="Title 1">
+            <a:extLst>
+              <a:ext uri="{FF2B5EF4-FFF2-40B4-BE49-F238E27FC236}">
+                <a16:creationId xmlns:a16="http://schemas.microsoft.com/office/drawing/2014/main" id="{55D577B2-35AC-2924-A08A-2D2B7886EC33}"/>
+              </a:ext>
+            </a:extLst>
+          </p:cNvPr>
+          <p:cNvSpPr>
+            <a:spLocks noGrp="1"/>
+          </p:cNvSpPr>
+          <p:nvPr>
+            <p:ph type="title"/>
+          </p:nvPr>
+        </p:nvSpPr>
+        <p:spPr/>
+        <p:txBody>
+          <a:bodyPr/>
+          <a:lstStyle/>
+          <a:p>
+            <a:endParaRPr lang="en-GB"/>
+          </a:p>
+        </p:txBody>
+      </p:sp>
+      <p:sp>
+        <p:nvSpPr>
+          <p:cNvPr id="3" name="Content Placeholder 2">
+            <a:extLst>
+              <a:ext uri="{FF2B5EF4-FFF2-40B4-BE49-F238E27FC236}">
+                <a16:creationId xmlns:a16="http://schemas.microsoft.com/office/drawing/2014/main" id="{1C5D299E-D686-5701-912F-EFE749F19A1F}"/>
+              </a:ext>
+            </a:extLst>
+          </p:cNvPr>
+          <p:cNvSpPr>
+            <a:spLocks noGrp="1"/>
+          </p:cNvSpPr>
+          <p:nvPr>
+            <p:ph idx="1"/>
+          </p:nvPr>
+        </p:nvSpPr>
+        <p:spPr/>
+        <p:txBody>
+          <a:bodyPr/>
+          <a:lstStyle/>
+          <a:p>
+            <a:endParaRPr lang="en-GB"/>
+          </a:p>
+        </p:txBody>
+      </p:sp>
+      <p:sp>
+        <p:nvSpPr>
+          <p:cNvPr id="4" name="Oval 3">
+            <a:extLst>
+              <a:ext uri="{FF2B5EF4-FFF2-40B4-BE49-F238E27FC236}">
+                <a16:creationId xmlns:a16="http://schemas.microsoft.com/office/drawing/2014/main" id="{41D150E5-2012-C830-E81D-F4EDCDDA5C1A}"/>
+              </a:ext>
+            </a:extLst>
+          </p:cNvPr>
+          <p:cNvSpPr/>
+          <p:nvPr/>
+        </p:nvSpPr>
+        <p:spPr>
+          <a:xfrm>
+            <a:off x="5257800" y="502920"/>
+            <a:ext cx="2176272" cy="2596896"/>
+          </a:xfrm>
+          <a:prstGeom prst="ellipse">
+            <a:avLst/>
+          </a:prstGeom>
+        </p:spPr>
+        <p:style>
+          <a:lnRef idx="2">
+            <a:schemeClr val="accent1">
+              <a:shade val="15000"/>
+            </a:schemeClr>
+          </a:lnRef>
+          <a:fillRef idx="1">
+            <a:schemeClr val="accent1"/>
+          </a:fillRef>
+          <a:effectRef idx="0">
+            <a:schemeClr val="accent1"/>
+          </a:effectRef>
+          <a:fontRef idx="minor">
+            <a:schemeClr val="lt1"/>
+          </a:fontRef>
+        </p:style>
+        <p:txBody>
+          <a:bodyPr rtlCol="0" anchor="ctr"/>
+          <a:lstStyle/>
+          <a:p>
+            <a:pPr algn="ctr"/>
+            <a:endParaRPr lang="en-GB"/>
+          </a:p>
+        </p:txBody>
+      </p:sp>
+    </p:spTree>
+    <p:extLst>
+      <p:ext uri="{BB962C8B-B14F-4D97-AF65-F5344CB8AC3E}">
+        <p14:creationId xmlns:p14="http://schemas.microsoft.com/office/powerpoint/2010/main" val="1083464176"/>
       </p:ext>
     </p:extLst>
   </p:cSld>

</xml_diff>